<commit_message>
fix footer, finish document
</commit_message>
<xml_diff>
--- a/myblog.pptx
+++ b/myblog.pptx
@@ -249,7 +249,7 @@
           <a:p>
             <a:fld id="{D090F118-FDC5-4298-8605-509719EC5E22}" type="datetimeFigureOut">
               <a:rPr lang="ko-KR" altLang="en-US" smtClean="0"/>
-              <a:t>2024-05-10</a:t>
+              <a:t>2024-05-16</a:t>
             </a:fld>
             <a:endParaRPr lang="ko-KR" altLang="en-US"/>
           </a:p>
@@ -426,7 +426,7 @@
           <a:p>
             <a:fld id="{7C8BDEB5-11C8-4FFD-966B-93DB62A96F3D}" type="datetimeFigureOut">
               <a:rPr lang="ko-KR" altLang="en-US" smtClean="0"/>
-              <a:t>2024-05-10</a:t>
+              <a:t>2024-05-16</a:t>
             </a:fld>
             <a:endParaRPr lang="ko-KR" altLang="en-US"/>
           </a:p>
@@ -24698,24 +24698,6 @@
           <a:chExt cx="0" cy="0"/>
         </a:xfrm>
       </p:grpSpPr>
-      <p:sp>
-        <p:nvSpPr>
-          <p:cNvPr id="3" name="그림 개체 틀 2">
-            <a:extLst>
-              <a:ext uri="{FF2B5EF4-FFF2-40B4-BE49-F238E27FC236}">
-                <a16:creationId xmlns:a16="http://schemas.microsoft.com/office/drawing/2014/main" id="{3E0DE57F-35FD-49AF-8C00-BFF0F42260DB}"/>
-              </a:ext>
-            </a:extLst>
-          </p:cNvPr>
-          <p:cNvSpPr>
-            <a:spLocks noGrp="1"/>
-          </p:cNvSpPr>
-          <p:nvPr>
-            <p:ph type="pic" idx="1"/>
-          </p:nvPr>
-        </p:nvSpPr>
-        <p:spPr/>
-      </p:sp>
       <p:grpSp>
         <p:nvGrpSpPr>
           <p:cNvPr id="6" name="Group 5"/>
@@ -24724,7 +24706,7 @@
         </p:nvGrpSpPr>
         <p:grpSpPr>
           <a:xfrm>
-            <a:off x="3596554" y="776883"/>
+            <a:off x="2987824" y="272276"/>
             <a:ext cx="649059" cy="649059"/>
             <a:chOff x="5696729" y="3628850"/>
             <a:chExt cx="1800000" cy="1800000"/>
@@ -24925,7 +24907,7 @@
             <a:lstStyle/>
             <a:p>
               <a:pPr algn="ctr"/>
-              <a:endParaRPr lang="ko-KR" altLang="en-US"/>
+              <a:endParaRPr lang="ko-KR" altLang="en-US" dirty="0"/>
             </a:p>
           </p:txBody>
         </p:sp>
@@ -25136,7 +25118,7 @@
         </p:nvSpPr>
         <p:spPr>
           <a:xfrm>
-            <a:off x="4264580" y="756429"/>
+            <a:off x="3785191" y="247760"/>
             <a:ext cx="4574192" cy="694997"/>
           </a:xfrm>
           <a:prstGeom prst="rect">
@@ -25361,7 +25343,7 @@
         </p:nvSpPr>
         <p:spPr>
           <a:xfrm>
-            <a:off x="4591962" y="1793132"/>
+            <a:off x="5546394" y="1754624"/>
             <a:ext cx="3096344" cy="3293209"/>
           </a:xfrm>
           <a:prstGeom prst="rect">
@@ -25547,6 +25529,65 @@
           </a:p>
         </p:txBody>
       </p:sp>
+      <p:sp>
+        <p:nvSpPr>
+          <p:cNvPr id="21" name="Rectangle 20">
+            <a:extLst>
+              <a:ext uri="{FF2B5EF4-FFF2-40B4-BE49-F238E27FC236}">
+                <a16:creationId xmlns:a16="http://schemas.microsoft.com/office/drawing/2014/main" id="{54F8FBC7-55B0-C494-1072-3356D53222FF}"/>
+              </a:ext>
+            </a:extLst>
+          </p:cNvPr>
+          <p:cNvSpPr/>
+          <p:nvPr/>
+        </p:nvSpPr>
+        <p:spPr>
+          <a:xfrm>
+            <a:off x="251520" y="1414619"/>
+            <a:ext cx="5150858" cy="3456606"/>
+          </a:xfrm>
+          <a:prstGeom prst="rect">
+            <a:avLst/>
+          </a:prstGeom>
+          <a:blipFill>
+            <a:blip r:embed="rId2"/>
+            <a:stretch>
+              <a:fillRect/>
+            </a:stretch>
+          </a:blipFill>
+          <a:ln w="79375">
+            <a:solidFill>
+              <a:schemeClr val="tx2">
+                <a:lumMod val="50000"/>
+              </a:schemeClr>
+            </a:solidFill>
+          </a:ln>
+        </p:spPr>
+        <p:style>
+          <a:lnRef idx="2">
+            <a:schemeClr val="accent1">
+              <a:shade val="50000"/>
+            </a:schemeClr>
+          </a:lnRef>
+          <a:fillRef idx="1">
+            <a:schemeClr val="accent1"/>
+          </a:fillRef>
+          <a:effectRef idx="0">
+            <a:schemeClr val="accent1"/>
+          </a:effectRef>
+          <a:fontRef idx="minor">
+            <a:schemeClr val="lt1"/>
+          </a:fontRef>
+        </p:style>
+        <p:txBody>
+          <a:bodyPr rtlCol="0" anchor="ctr"/>
+          <a:lstStyle/>
+          <a:p>
+            <a:pPr algn="ctr"/>
+            <a:endParaRPr lang="en-US"/>
+          </a:p>
+        </p:txBody>
+      </p:sp>
     </p:spTree>
     <p:extLst>
       <p:ext uri="{BB962C8B-B14F-4D97-AF65-F5344CB8AC3E}">
@@ -25619,60 +25660,101 @@
           </a:p>
         </p:txBody>
       </p:sp>
-      <p:sp>
-        <p:nvSpPr>
-          <p:cNvPr id="5" name="그림 개체 틀 4">
+      <p:pic>
+        <p:nvPicPr>
+          <p:cNvPr id="16" name="Picture 15">
             <a:extLst>
               <a:ext uri="{FF2B5EF4-FFF2-40B4-BE49-F238E27FC236}">
-                <a16:creationId xmlns:a16="http://schemas.microsoft.com/office/drawing/2014/main" id="{81F98F50-A2B9-4892-BE78-7C74FD4A371F}"/>
+                <a16:creationId xmlns:a16="http://schemas.microsoft.com/office/drawing/2014/main" id="{8EB6DFF0-4E3F-6253-86F4-BCF4EB319013}"/>
               </a:ext>
             </a:extLst>
           </p:cNvPr>
-          <p:cNvSpPr>
-            <a:spLocks noGrp="1"/>
-          </p:cNvSpPr>
-          <p:nvPr>
-            <p:ph type="pic" idx="13"/>
-          </p:nvPr>
-        </p:nvSpPr>
-        <p:spPr/>
-      </p:sp>
-      <p:sp>
-        <p:nvSpPr>
-          <p:cNvPr id="7" name="그림 개체 틀 6">
+          <p:cNvPicPr>
+            <a:picLocks noChangeAspect="1"/>
+          </p:cNvPicPr>
+          <p:nvPr/>
+        </p:nvPicPr>
+        <p:blipFill>
+          <a:blip r:embed="rId2"/>
+          <a:stretch>
+            <a:fillRect/>
+          </a:stretch>
+        </p:blipFill>
+        <p:spPr>
+          <a:xfrm>
+            <a:off x="0" y="3882070"/>
+            <a:ext cx="3391355" cy="1206469"/>
+          </a:xfrm>
+          <a:prstGeom prst="rect">
+            <a:avLst/>
+          </a:prstGeom>
+        </p:spPr>
+      </p:pic>
+      <p:pic>
+        <p:nvPicPr>
+          <p:cNvPr id="18" name="Picture 17">
             <a:extLst>
               <a:ext uri="{FF2B5EF4-FFF2-40B4-BE49-F238E27FC236}">
-                <a16:creationId xmlns:a16="http://schemas.microsoft.com/office/drawing/2014/main" id="{718BFC98-CFF2-4607-9CBF-651E3ACBD417}"/>
+                <a16:creationId xmlns:a16="http://schemas.microsoft.com/office/drawing/2014/main" id="{D38CAC94-7522-1621-FD99-101402FE0B51}"/>
               </a:ext>
             </a:extLst>
           </p:cNvPr>
-          <p:cNvSpPr>
-            <a:spLocks noGrp="1"/>
-          </p:cNvSpPr>
-          <p:nvPr>
-            <p:ph type="pic" idx="12"/>
-          </p:nvPr>
-        </p:nvSpPr>
-        <p:spPr/>
-      </p:sp>
-      <p:sp>
-        <p:nvSpPr>
-          <p:cNvPr id="9" name="그림 개체 틀 8">
+          <p:cNvPicPr>
+            <a:picLocks noChangeAspect="1"/>
+          </p:cNvPicPr>
+          <p:nvPr/>
+        </p:nvPicPr>
+        <p:blipFill>
+          <a:blip r:embed="rId3"/>
+          <a:stretch>
+            <a:fillRect/>
+          </a:stretch>
+        </p:blipFill>
+        <p:spPr>
+          <a:xfrm>
+            <a:off x="5891092" y="899960"/>
+            <a:ext cx="3229426" cy="695422"/>
+          </a:xfrm>
+          <a:prstGeom prst="rect">
+            <a:avLst/>
+          </a:prstGeom>
+        </p:spPr>
+      </p:pic>
+      <p:pic>
+        <p:nvPicPr>
+          <p:cNvPr id="20" name="Picture 19">
             <a:extLst>
               <a:ext uri="{FF2B5EF4-FFF2-40B4-BE49-F238E27FC236}">
-                <a16:creationId xmlns:a16="http://schemas.microsoft.com/office/drawing/2014/main" id="{245CBA2D-5046-4AB0-8943-865ADCD3B1E9}"/>
+                <a16:creationId xmlns:a16="http://schemas.microsoft.com/office/drawing/2014/main" id="{45AC8B67-A4C9-4C90-2ED0-3B044FFF6FB4}"/>
               </a:ext>
             </a:extLst>
           </p:cNvPr>
-          <p:cNvSpPr>
-            <a:spLocks noGrp="1"/>
-          </p:cNvSpPr>
-          <p:nvPr>
-            <p:ph type="pic" idx="14"/>
-          </p:nvPr>
-        </p:nvSpPr>
-        <p:spPr/>
-      </p:sp>
+          <p:cNvPicPr>
+            <a:picLocks noChangeAspect="1"/>
+          </p:cNvPicPr>
+          <p:nvPr/>
+        </p:nvPicPr>
+        <p:blipFill rotWithShape="1">
+          <a:blip r:embed="rId4">
+            <a:extLst>
+              <a:ext uri="{28A0092B-C50C-407E-A947-70E740481C1C}">
+                <a14:useLocalDpi xmlns:a14="http://schemas.microsoft.com/office/drawing/2010/main" val="0"/>
+              </a:ext>
+            </a:extLst>
+          </a:blip>
+          <a:srcRect l="50219" t="-2879"/>
+          <a:stretch/>
+        </p:blipFill>
+        <p:spPr>
+          <a:xfrm>
+            <a:off x="3022758" y="1476024"/>
+            <a:ext cx="3098484" cy="2044261"/>
+          </a:xfrm>
+          <a:prstGeom prst="rect">
+            <a:avLst/>
+          </a:prstGeom>
+        </p:spPr>
+      </p:pic>
     </p:spTree>
     <p:extLst>
       <p:ext uri="{BB962C8B-B14F-4D97-AF65-F5344CB8AC3E}">
@@ -25824,42 +25906,72 @@
           </p:txBody>
         </p:sp>
       </p:grpSp>
-      <p:sp>
-        <p:nvSpPr>
-          <p:cNvPr id="3" name="그림 개체 틀 2">
+      <p:pic>
+        <p:nvPicPr>
+          <p:cNvPr id="9" name="Picture 8">
             <a:extLst>
               <a:ext uri="{FF2B5EF4-FFF2-40B4-BE49-F238E27FC236}">
-                <a16:creationId xmlns:a16="http://schemas.microsoft.com/office/drawing/2014/main" id="{B06C8358-8667-4886-B452-17578886E286}"/>
+                <a16:creationId xmlns:a16="http://schemas.microsoft.com/office/drawing/2014/main" id="{91449FF1-2A0B-5626-CCEE-44205327D2D2}"/>
               </a:ext>
             </a:extLst>
           </p:cNvPr>
-          <p:cNvSpPr>
-            <a:spLocks noGrp="1"/>
-          </p:cNvSpPr>
-          <p:nvPr>
-            <p:ph type="pic" idx="1"/>
-          </p:nvPr>
-        </p:nvSpPr>
-        <p:spPr/>
-      </p:sp>
-      <p:sp>
-        <p:nvSpPr>
-          <p:cNvPr id="5" name="그림 개체 틀 4">
+          <p:cNvPicPr>
+            <a:picLocks noChangeAspect="1"/>
+          </p:cNvPicPr>
+          <p:nvPr/>
+        </p:nvPicPr>
+        <p:blipFill>
+          <a:blip r:embed="rId2"/>
+          <a:stretch>
+            <a:fillRect/>
+          </a:stretch>
+        </p:blipFill>
+        <p:spPr>
+          <a:xfrm>
+            <a:off x="323528" y="339502"/>
+            <a:ext cx="3542118" cy="1635814"/>
+          </a:xfrm>
+          <a:prstGeom prst="rect">
+            <a:avLst/>
+          </a:prstGeom>
+        </p:spPr>
+      </p:pic>
+      <p:pic>
+        <p:nvPicPr>
+          <p:cNvPr id="11" name="Picture 10">
             <a:extLst>
               <a:ext uri="{FF2B5EF4-FFF2-40B4-BE49-F238E27FC236}">
-                <a16:creationId xmlns:a16="http://schemas.microsoft.com/office/drawing/2014/main" id="{7F585C30-C0E1-4FBE-8057-4B2780A510D6}"/>
+                <a16:creationId xmlns:a16="http://schemas.microsoft.com/office/drawing/2014/main" id="{279ECB61-EDDE-0B60-3273-1EB0A092AA0C}"/>
               </a:ext>
             </a:extLst>
           </p:cNvPr>
-          <p:cNvSpPr>
-            <a:spLocks noGrp="1"/>
-          </p:cNvSpPr>
-          <p:nvPr>
-            <p:ph type="pic" idx="10"/>
-          </p:nvPr>
-        </p:nvSpPr>
-        <p:spPr/>
-      </p:sp>
+          <p:cNvPicPr>
+            <a:picLocks noChangeAspect="1"/>
+          </p:cNvPicPr>
+          <p:nvPr/>
+        </p:nvPicPr>
+        <p:blipFill>
+          <a:blip r:embed="rId3">
+            <a:extLst>
+              <a:ext uri="{28A0092B-C50C-407E-A947-70E740481C1C}">
+                <a14:useLocalDpi xmlns:a14="http://schemas.microsoft.com/office/drawing/2010/main" val="0"/>
+              </a:ext>
+            </a:extLst>
+          </a:blip>
+          <a:stretch>
+            <a:fillRect/>
+          </a:stretch>
+        </p:blipFill>
+        <p:spPr>
+          <a:xfrm>
+            <a:off x="3200817" y="2970450"/>
+            <a:ext cx="5693675" cy="2062104"/>
+          </a:xfrm>
+          <a:prstGeom prst="rect">
+            <a:avLst/>
+          </a:prstGeom>
+        </p:spPr>
+      </p:pic>
     </p:spTree>
     <p:extLst>
       <p:ext uri="{BB962C8B-B14F-4D97-AF65-F5344CB8AC3E}">
@@ -26123,42 +26235,124 @@
           </a:p>
         </p:txBody>
       </p:sp>
-      <p:sp>
-        <p:nvSpPr>
-          <p:cNvPr id="3" name="그림 개체 틀 2">
+      <p:pic>
+        <p:nvPicPr>
+          <p:cNvPr id="4" name="Picture 3">
             <a:extLst>
               <a:ext uri="{FF2B5EF4-FFF2-40B4-BE49-F238E27FC236}">
-                <a16:creationId xmlns:a16="http://schemas.microsoft.com/office/drawing/2014/main" id="{532DBA56-5283-45A9-BD1A-BB539C8C550E}"/>
+                <a16:creationId xmlns:a16="http://schemas.microsoft.com/office/drawing/2014/main" id="{4EEF7BEA-2A10-2D64-BFD0-727FD112C594}"/>
               </a:ext>
             </a:extLst>
           </p:cNvPr>
-          <p:cNvSpPr>
-            <a:spLocks noGrp="1"/>
-          </p:cNvSpPr>
-          <p:nvPr>
-            <p:ph type="pic" idx="1"/>
-          </p:nvPr>
-        </p:nvSpPr>
-        <p:spPr/>
-      </p:sp>
-      <p:sp>
-        <p:nvSpPr>
-          <p:cNvPr id="6" name="그림 개체 틀 5">
+          <p:cNvPicPr>
+            <a:picLocks noChangeAspect="1"/>
+          </p:cNvPicPr>
+          <p:nvPr/>
+        </p:nvPicPr>
+        <p:blipFill rotWithShape="1">
+          <a:blip r:embed="rId3"/>
+          <a:srcRect l="17076" r="11089"/>
+          <a:stretch/>
+        </p:blipFill>
+        <p:spPr>
+          <a:xfrm>
+            <a:off x="34207" y="1157719"/>
+            <a:ext cx="2377553" cy="3120440"/>
+          </a:xfrm>
+          <a:prstGeom prst="rect">
+            <a:avLst/>
+          </a:prstGeom>
+        </p:spPr>
+      </p:pic>
+      <p:pic>
+        <p:nvPicPr>
+          <p:cNvPr id="7" name="Picture 6">
             <a:extLst>
               <a:ext uri="{FF2B5EF4-FFF2-40B4-BE49-F238E27FC236}">
-                <a16:creationId xmlns:a16="http://schemas.microsoft.com/office/drawing/2014/main" id="{8A99D950-06C3-449E-8C35-56AC840B4145}"/>
+                <a16:creationId xmlns:a16="http://schemas.microsoft.com/office/drawing/2014/main" id="{90A9FE8D-9969-81C1-94DB-181E1B39C95B}"/>
               </a:ext>
             </a:extLst>
           </p:cNvPr>
-          <p:cNvSpPr>
-            <a:spLocks noGrp="1"/>
-          </p:cNvSpPr>
-          <p:nvPr>
-            <p:ph type="pic" idx="10"/>
-          </p:nvPr>
-        </p:nvSpPr>
-        <p:spPr/>
-      </p:sp>
+          <p:cNvPicPr>
+            <a:picLocks noChangeAspect="1"/>
+          </p:cNvPicPr>
+          <p:nvPr/>
+        </p:nvPicPr>
+        <p:blipFill>
+          <a:blip r:embed="rId4"/>
+          <a:stretch>
+            <a:fillRect/>
+          </a:stretch>
+        </p:blipFill>
+        <p:spPr>
+          <a:xfrm>
+            <a:off x="6087859" y="81383"/>
+            <a:ext cx="2159175" cy="2152672"/>
+          </a:xfrm>
+          <a:prstGeom prst="rect">
+            <a:avLst/>
+          </a:prstGeom>
+        </p:spPr>
+      </p:pic>
+      <p:pic>
+        <p:nvPicPr>
+          <p:cNvPr id="9" name="Picture 8">
+            <a:extLst>
+              <a:ext uri="{FF2B5EF4-FFF2-40B4-BE49-F238E27FC236}">
+                <a16:creationId xmlns:a16="http://schemas.microsoft.com/office/drawing/2014/main" id="{2D179B9E-EADE-E8A2-26D7-1D605EEA0F36}"/>
+              </a:ext>
+            </a:extLst>
+          </p:cNvPr>
+          <p:cNvPicPr>
+            <a:picLocks noChangeAspect="1"/>
+          </p:cNvPicPr>
+          <p:nvPr/>
+        </p:nvPicPr>
+        <p:blipFill rotWithShape="1">
+          <a:blip r:embed="rId5"/>
+          <a:srcRect r="13992"/>
+          <a:stretch/>
+        </p:blipFill>
+        <p:spPr>
+          <a:xfrm>
+            <a:off x="6087858" y="2179945"/>
+            <a:ext cx="2159176" cy="1075987"/>
+          </a:xfrm>
+          <a:prstGeom prst="rect">
+            <a:avLst/>
+          </a:prstGeom>
+        </p:spPr>
+      </p:pic>
+      <p:pic>
+        <p:nvPicPr>
+          <p:cNvPr id="11" name="Picture 10">
+            <a:extLst>
+              <a:ext uri="{FF2B5EF4-FFF2-40B4-BE49-F238E27FC236}">
+                <a16:creationId xmlns:a16="http://schemas.microsoft.com/office/drawing/2014/main" id="{7219C676-18C4-3DBF-D91C-5B4A4C7EC6AD}"/>
+              </a:ext>
+            </a:extLst>
+          </p:cNvPr>
+          <p:cNvPicPr>
+            <a:picLocks noChangeAspect="1"/>
+          </p:cNvPicPr>
+          <p:nvPr/>
+        </p:nvPicPr>
+        <p:blipFill>
+          <a:blip r:embed="rId6"/>
+          <a:stretch>
+            <a:fillRect/>
+          </a:stretch>
+        </p:blipFill>
+        <p:spPr>
+          <a:xfrm>
+            <a:off x="6087857" y="2722334"/>
+            <a:ext cx="2162760" cy="3120440"/>
+          </a:xfrm>
+          <a:prstGeom prst="rect">
+            <a:avLst/>
+          </a:prstGeom>
+        </p:spPr>
+      </p:pic>
     </p:spTree>
     <p:extLst>
       <p:ext uri="{BB962C8B-B14F-4D97-AF65-F5344CB8AC3E}">
@@ -29383,7 +29577,7 @@
         </p:nvSpPr>
         <p:spPr>
           <a:xfrm>
-            <a:off x="1164764" y="555526"/>
+            <a:off x="1164764" y="-164554"/>
             <a:ext cx="7979236" cy="1152128"/>
           </a:xfrm>
         </p:spPr>
@@ -29414,6 +29608,42 @@
           </a:p>
         </p:txBody>
       </p:sp>
+      <p:pic>
+        <p:nvPicPr>
+          <p:cNvPr id="4" name="Picture 3">
+            <a:extLst>
+              <a:ext uri="{FF2B5EF4-FFF2-40B4-BE49-F238E27FC236}">
+                <a16:creationId xmlns:a16="http://schemas.microsoft.com/office/drawing/2014/main" id="{1E72C0F0-8436-1E87-5268-BC395A6C47A2}"/>
+              </a:ext>
+            </a:extLst>
+          </p:cNvPr>
+          <p:cNvPicPr>
+            <a:picLocks noChangeAspect="1"/>
+          </p:cNvPicPr>
+          <p:nvPr/>
+        </p:nvPicPr>
+        <p:blipFill>
+          <a:blip r:embed="rId2">
+            <a:extLst>
+              <a:ext uri="{28A0092B-C50C-407E-A947-70E740481C1C}">
+                <a14:useLocalDpi xmlns:a14="http://schemas.microsoft.com/office/drawing/2010/main" val="0"/>
+              </a:ext>
+            </a:extLst>
+          </a:blip>
+          <a:stretch>
+            <a:fillRect/>
+          </a:stretch>
+        </p:blipFill>
+        <p:spPr>
+          <a:xfrm>
+            <a:off x="3491880" y="1017122"/>
+            <a:ext cx="2607472" cy="3754760"/>
+          </a:xfrm>
+          <a:prstGeom prst="rect">
+            <a:avLst/>
+          </a:prstGeom>
+        </p:spPr>
+      </p:pic>
     </p:spTree>
     <p:extLst>
       <p:ext uri="{BB962C8B-B14F-4D97-AF65-F5344CB8AC3E}">

</xml_diff>